<commit_message>
impose restriction on concurrent warmup dataloads
</commit_message>
<xml_diff>
--- a/proposals/controller/v0.4.0_distributed_load/images_raw/dataload_workflow.pptx
+++ b/proposals/controller/v0.4.0_distributed_load/images_raw/dataload_workflow.pptx
@@ -3340,7 +3340,7 @@
         </p:nvSpPr>
         <p:spPr>
           <a:xfrm>
-            <a:off x="2441357" y="2772052"/>
+            <a:off x="2919343" y="2867121"/>
             <a:ext cx="2228298" cy="1124135"/>
           </a:xfrm>
           <a:prstGeom prst="roundRect">
@@ -3409,7 +3409,7 @@
         </p:nvCxnSpPr>
         <p:spPr>
           <a:xfrm flipH="1">
-            <a:off x="3555506" y="1539896"/>
+            <a:off x="4033492" y="1634965"/>
             <a:ext cx="1614920" cy="1232156"/>
           </a:xfrm>
           <a:prstGeom prst="straightConnector1">
@@ -3451,7 +3451,7 @@
         </p:nvSpPr>
         <p:spPr>
           <a:xfrm>
-            <a:off x="3604334" y="1710199"/>
+            <a:off x="4082320" y="1807152"/>
             <a:ext cx="1065321" cy="338554"/>
           </a:xfrm>
           <a:prstGeom prst="rect">
@@ -3487,7 +3487,7 @@
         </p:nvSpPr>
         <p:spPr>
           <a:xfrm>
-            <a:off x="7684547" y="2305595"/>
+            <a:off x="8162533" y="2400664"/>
             <a:ext cx="1484049" cy="765699"/>
           </a:xfrm>
           <a:prstGeom prst="rect">
@@ -3548,7 +3548,7 @@
         </p:nvSpPr>
         <p:spPr>
           <a:xfrm>
-            <a:off x="7684547" y="3896189"/>
+            <a:off x="8162533" y="3991258"/>
             <a:ext cx="1484049" cy="765699"/>
           </a:xfrm>
           <a:prstGeom prst="rect">
@@ -3612,7 +3612,7 @@
         </p:nvCxnSpPr>
         <p:spPr>
           <a:xfrm>
-            <a:off x="4669655" y="3334120"/>
+            <a:off x="5147641" y="3429189"/>
             <a:ext cx="2141734" cy="0"/>
           </a:xfrm>
           <a:prstGeom prst="line">
@@ -3655,7 +3655,7 @@
         </p:nvCxnSpPr>
         <p:spPr>
           <a:xfrm flipV="1">
-            <a:off x="6816754" y="2688445"/>
+            <a:off x="7294740" y="2783514"/>
             <a:ext cx="867793" cy="651953"/>
           </a:xfrm>
           <a:prstGeom prst="bentConnector3">
@@ -3702,7 +3702,7 @@
         </p:nvCxnSpPr>
         <p:spPr>
           <a:xfrm rot="16200000" flipH="1">
-            <a:off x="6775508" y="3370000"/>
+            <a:off x="7253494" y="3465069"/>
             <a:ext cx="944920" cy="873158"/>
           </a:xfrm>
           <a:prstGeom prst="bentConnector2">
@@ -3744,7 +3744,7 @@
         </p:nvSpPr>
         <p:spPr>
           <a:xfrm>
-            <a:off x="5225252" y="3372474"/>
+            <a:off x="5703238" y="3467543"/>
             <a:ext cx="1233995" cy="338554"/>
           </a:xfrm>
           <a:prstGeom prst="rect">
@@ -3782,7 +3782,7 @@
         </p:nvCxnSpPr>
         <p:spPr>
           <a:xfrm>
-            <a:off x="3232209" y="3896187"/>
+            <a:off x="3710195" y="3991256"/>
             <a:ext cx="0" cy="1484193"/>
           </a:xfrm>
           <a:prstGeom prst="straightConnector1">
@@ -3824,7 +3824,7 @@
         </p:nvSpPr>
         <p:spPr>
           <a:xfrm>
-            <a:off x="2207534" y="4469006"/>
+            <a:off x="2685520" y="4564075"/>
             <a:ext cx="984030" cy="338554"/>
           </a:xfrm>
           <a:prstGeom prst="rect">
@@ -3840,7 +3840,7 @@
           <a:p>
             <a:r>
               <a:rPr lang="en-US" altLang="zh-CN" sz="1600" dirty="0"/>
-              <a:t>3. Create</a:t>
+              <a:t>4. Create</a:t>
             </a:r>
             <a:endParaRPr lang="zh-CN" altLang="en-US" sz="1600" dirty="0"/>
           </a:p>
@@ -3860,7 +3860,7 @@
         </p:nvSpPr>
         <p:spPr>
           <a:xfrm>
-            <a:off x="8426571" y="3342477"/>
+            <a:off x="8953386" y="3405968"/>
             <a:ext cx="2095132" cy="338554"/>
           </a:xfrm>
           <a:prstGeom prst="rect">
@@ -3896,7 +3896,7 @@
         </p:nvSpPr>
         <p:spPr>
           <a:xfrm>
-            <a:off x="2813481" y="5380380"/>
+            <a:off x="3291467" y="5475449"/>
             <a:ext cx="1484049" cy="765699"/>
           </a:xfrm>
           <a:prstGeom prst="rect">
@@ -3953,6 +3953,7 @@
             </a:extLst>
           </p:cNvPr>
           <p:cNvCxnSpPr>
+            <a:cxnSpLocks/>
             <a:stCxn id="2" idx="3"/>
             <a:endCxn id="24" idx="2"/>
           </p:cNvCxnSpPr>
@@ -3960,7 +3961,7 @@
         </p:nvCxnSpPr>
         <p:spPr>
           <a:xfrm flipV="1">
-            <a:off x="4297530" y="4661888"/>
+            <a:off x="4775516" y="4756957"/>
             <a:ext cx="4129042" cy="1101342"/>
           </a:xfrm>
           <a:prstGeom prst="bentConnector2">
@@ -4002,7 +4003,7 @@
         </p:nvSpPr>
         <p:spPr>
           <a:xfrm>
-            <a:off x="6087120" y="5807525"/>
+            <a:off x="6391343" y="5914582"/>
             <a:ext cx="1334611" cy="338554"/>
           </a:xfrm>
           <a:prstGeom prst="rect">
@@ -4018,7 +4019,7 @@
           <a:p>
             <a:r>
               <a:rPr lang="en-US" altLang="zh-CN" sz="1600" dirty="0"/>
-              <a:t>4. Load data</a:t>
+              <a:t>5. Load data</a:t>
             </a:r>
             <a:endParaRPr lang="zh-CN" altLang="en-US" sz="1600" dirty="0"/>
           </a:p>
@@ -4041,7 +4042,7 @@
         </p:nvCxnSpPr>
         <p:spPr>
           <a:xfrm flipV="1">
-            <a:off x="8426572" y="3071294"/>
+            <a:off x="8904558" y="3166363"/>
             <a:ext cx="0" cy="824895"/>
           </a:xfrm>
           <a:prstGeom prst="straightConnector1">
@@ -4086,7 +4087,7 @@
         </p:nvCxnSpPr>
         <p:spPr>
           <a:xfrm>
-            <a:off x="3864003" y="3896187"/>
+            <a:off x="4341989" y="3991256"/>
             <a:ext cx="0" cy="1484193"/>
           </a:xfrm>
           <a:prstGeom prst="straightConnector1">
@@ -4128,7 +4129,7 @@
         </p:nvSpPr>
         <p:spPr>
           <a:xfrm>
-            <a:off x="3945293" y="4489699"/>
+            <a:off x="4423279" y="4584768"/>
             <a:ext cx="1807425" cy="338554"/>
           </a:xfrm>
           <a:prstGeom prst="rect">
@@ -4144,7 +4145,7 @@
           <a:p>
             <a:r>
               <a:rPr lang="en-US" altLang="zh-CN" sz="1600" dirty="0"/>
-              <a:t>5. Query Status</a:t>
+              <a:t>6. Query Status</a:t>
             </a:r>
             <a:endParaRPr lang="zh-CN" altLang="en-US" sz="1600" dirty="0"/>
           </a:p>
@@ -4166,7 +4167,7 @@
         </p:nvCxnSpPr>
         <p:spPr>
           <a:xfrm flipV="1">
-            <a:off x="4297530" y="1542881"/>
+            <a:off x="4775516" y="1637950"/>
             <a:ext cx="1663399" cy="1229172"/>
           </a:xfrm>
           <a:prstGeom prst="straightConnector1">
@@ -4208,7 +4209,7 @@
         </p:nvSpPr>
         <p:spPr>
           <a:xfrm>
-            <a:off x="5113644" y="2136318"/>
+            <a:off x="5591630" y="2231387"/>
             <a:ext cx="1807425" cy="338554"/>
           </a:xfrm>
           <a:prstGeom prst="rect">
@@ -4224,7 +4225,7 @@
           <a:p>
             <a:r>
               <a:rPr lang="en-US" altLang="zh-CN" sz="1600" dirty="0"/>
-              <a:t>6. Update Status</a:t>
+              <a:t>7. Update Status</a:t>
             </a:r>
             <a:endParaRPr lang="zh-CN" altLang="en-US" sz="1600" dirty="0"/>
           </a:p>
@@ -4248,7 +4249,7 @@
         </p:nvCxnSpPr>
         <p:spPr>
           <a:xfrm>
-            <a:off x="6333054" y="1163018"/>
+            <a:off x="6811040" y="1258087"/>
             <a:ext cx="2093518" cy="1142577"/>
           </a:xfrm>
           <a:prstGeom prst="bentConnector2">
@@ -4291,7 +4292,7 @@
         </p:nvSpPr>
         <p:spPr>
           <a:xfrm>
-            <a:off x="8426571" y="1370619"/>
+            <a:off x="8953386" y="1550326"/>
             <a:ext cx="2095132" cy="338554"/>
           </a:xfrm>
           <a:prstGeom prst="rect">
@@ -4327,7 +4328,7 @@
         </p:nvSpPr>
         <p:spPr>
           <a:xfrm>
-            <a:off x="4849005" y="780168"/>
+            <a:off x="5326991" y="875237"/>
             <a:ext cx="1484049" cy="765699"/>
           </a:xfrm>
           <a:prstGeom prst="rect">
@@ -4370,6 +4371,356 @@
                 </a:solidFill>
               </a:rPr>
               <a:t>DataLoad</a:t>
+            </a:r>
+          </a:p>
+        </p:txBody>
+      </p:sp>
+      <p:sp>
+        <p:nvSpPr>
+          <p:cNvPr id="5" name="矩形 4">
+            <a:extLst>
+              <a:ext uri="{FF2B5EF4-FFF2-40B4-BE49-F238E27FC236}">
+                <a16:creationId xmlns:a16="http://schemas.microsoft.com/office/drawing/2014/main" id="{D7E08EED-AA1A-4CB4-854B-FDFA0F9FF326}"/>
+              </a:ext>
+            </a:extLst>
+          </p:cNvPr>
+          <p:cNvSpPr/>
+          <p:nvPr/>
+        </p:nvSpPr>
+        <p:spPr>
+          <a:xfrm>
+            <a:off x="2435642" y="869266"/>
+            <a:ext cx="1484049" cy="765699"/>
+          </a:xfrm>
+          <a:prstGeom prst="rect">
+            <a:avLst/>
+          </a:prstGeom>
+          <a:solidFill>
+            <a:schemeClr val="bg1"/>
+          </a:solidFill>
+          <a:ln w="28575">
+            <a:solidFill>
+              <a:schemeClr val="tx1"/>
+            </a:solidFill>
+            <a:prstDash val="sysDash"/>
+          </a:ln>
+        </p:spPr>
+        <p:style>
+          <a:lnRef idx="2">
+            <a:schemeClr val="accent1">
+              <a:shade val="50000"/>
+            </a:schemeClr>
+          </a:lnRef>
+          <a:fillRef idx="1">
+            <a:schemeClr val="accent1"/>
+          </a:fillRef>
+          <a:effectRef idx="0">
+            <a:schemeClr val="accent1"/>
+          </a:effectRef>
+          <a:fontRef idx="minor">
+            <a:schemeClr val="lt1"/>
+          </a:fontRef>
+        </p:style>
+        <p:txBody>
+          <a:bodyPr rtlCol="0" anchor="ctr"/>
+          <a:lstStyle/>
+          <a:p>
+            <a:pPr algn="ctr"/>
+            <a:r>
+              <a:rPr lang="en-US" altLang="zh-CN" b="1" dirty="0">
+                <a:solidFill>
+                  <a:schemeClr val="tx1"/>
+                </a:solidFill>
+              </a:rPr>
+              <a:t>Other</a:t>
+            </a:r>
+          </a:p>
+          <a:p>
+            <a:pPr algn="ctr"/>
+            <a:r>
+              <a:rPr lang="en-US" altLang="zh-CN" b="1" dirty="0">
+                <a:solidFill>
+                  <a:schemeClr val="tx1"/>
+                </a:solidFill>
+              </a:rPr>
+              <a:t>DataLoads</a:t>
+            </a:r>
+          </a:p>
+        </p:txBody>
+      </p:sp>
+      <p:cxnSp>
+        <p:nvCxnSpPr>
+          <p:cNvPr id="10" name="直接箭头连接符 9">
+            <a:extLst>
+              <a:ext uri="{FF2B5EF4-FFF2-40B4-BE49-F238E27FC236}">
+                <a16:creationId xmlns:a16="http://schemas.microsoft.com/office/drawing/2014/main" id="{F1BEF034-67BA-4BAE-BE8F-E2CB4B088148}"/>
+              </a:ext>
+            </a:extLst>
+          </p:cNvPr>
+          <p:cNvCxnSpPr>
+            <a:cxnSpLocks/>
+            <a:stCxn id="4" idx="0"/>
+            <a:endCxn id="35" idx="2"/>
+          </p:cNvCxnSpPr>
+          <p:nvPr/>
+        </p:nvCxnSpPr>
+        <p:spPr>
+          <a:xfrm flipH="1" flipV="1">
+            <a:off x="3346784" y="1814183"/>
+            <a:ext cx="686708" cy="1052938"/>
+          </a:xfrm>
+          <a:prstGeom prst="straightConnector1">
+            <a:avLst/>
+          </a:prstGeom>
+          <a:ln w="28575">
+            <a:solidFill>
+              <a:schemeClr val="tx1"/>
+            </a:solidFill>
+            <a:tailEnd type="triangle"/>
+          </a:ln>
+        </p:spPr>
+        <p:style>
+          <a:lnRef idx="1">
+            <a:schemeClr val="accent1"/>
+          </a:lnRef>
+          <a:fillRef idx="0">
+            <a:schemeClr val="accent1"/>
+          </a:fillRef>
+          <a:effectRef idx="0">
+            <a:schemeClr val="accent1"/>
+          </a:effectRef>
+          <a:fontRef idx="minor">
+            <a:schemeClr val="tx1"/>
+          </a:fontRef>
+        </p:style>
+      </p:cxnSp>
+      <p:cxnSp>
+        <p:nvCxnSpPr>
+          <p:cNvPr id="20" name="直接箭头连接符 19">
+            <a:extLst>
+              <a:ext uri="{FF2B5EF4-FFF2-40B4-BE49-F238E27FC236}">
+                <a16:creationId xmlns:a16="http://schemas.microsoft.com/office/drawing/2014/main" id="{D6580AD4-EACA-4657-B47E-F14D337BD7FA}"/>
+              </a:ext>
+            </a:extLst>
+          </p:cNvPr>
+          <p:cNvCxnSpPr>
+            <a:stCxn id="5" idx="0"/>
+            <a:endCxn id="22" idx="0"/>
+          </p:cNvCxnSpPr>
+          <p:nvPr/>
+        </p:nvCxnSpPr>
+        <p:spPr>
+          <a:xfrm rot="16200000" flipH="1">
+            <a:off x="5275413" y="-1228480"/>
+            <a:ext cx="1531398" cy="5726891"/>
+          </a:xfrm>
+          <a:prstGeom prst="bentConnector3">
+            <a:avLst>
+              <a:gd name="adj1" fmla="val -28841"/>
+            </a:avLst>
+          </a:prstGeom>
+          <a:ln w="28575">
+            <a:solidFill>
+              <a:schemeClr val="tx1"/>
+            </a:solidFill>
+            <a:prstDash val="sysDash"/>
+            <a:tailEnd type="triangle"/>
+          </a:ln>
+        </p:spPr>
+        <p:style>
+          <a:lnRef idx="1">
+            <a:schemeClr val="accent1"/>
+          </a:lnRef>
+          <a:fillRef idx="0">
+            <a:schemeClr val="accent1"/>
+          </a:fillRef>
+          <a:effectRef idx="0">
+            <a:schemeClr val="accent1"/>
+          </a:effectRef>
+          <a:fontRef idx="minor">
+            <a:schemeClr val="tx1"/>
+          </a:fontRef>
+        </p:style>
+      </p:cxnSp>
+      <p:sp>
+        <p:nvSpPr>
+          <p:cNvPr id="30" name="文本框 29">
+            <a:extLst>
+              <a:ext uri="{FF2B5EF4-FFF2-40B4-BE49-F238E27FC236}">
+                <a16:creationId xmlns:a16="http://schemas.microsoft.com/office/drawing/2014/main" id="{906F33BB-B0C2-4E34-9D41-B0C9FA31BA54}"/>
+              </a:ext>
+            </a:extLst>
+          </p:cNvPr>
+          <p:cNvSpPr txBox="1"/>
+          <p:nvPr/>
+        </p:nvSpPr>
+        <p:spPr>
+          <a:xfrm>
+            <a:off x="1917801" y="2102299"/>
+            <a:ext cx="1614920" cy="584775"/>
+          </a:xfrm>
+          <a:prstGeom prst="rect">
+            <a:avLst/>
+          </a:prstGeom>
+          <a:noFill/>
+        </p:spPr>
+        <p:txBody>
+          <a:bodyPr wrap="square" rtlCol="0">
+            <a:spAutoFit/>
+          </a:bodyPr>
+          <a:lstStyle/>
+          <a:p>
+            <a:pPr algn="r"/>
+            <a:r>
+              <a:rPr lang="en-US" altLang="zh-CN" sz="1600" dirty="0"/>
+              <a:t>3. Check Other DataLoads</a:t>
+            </a:r>
+            <a:endParaRPr lang="zh-CN" altLang="en-US" sz="1600" dirty="0"/>
+          </a:p>
+        </p:txBody>
+      </p:sp>
+      <p:sp>
+        <p:nvSpPr>
+          <p:cNvPr id="34" name="矩形 33">
+            <a:extLst>
+              <a:ext uri="{FF2B5EF4-FFF2-40B4-BE49-F238E27FC236}">
+                <a16:creationId xmlns:a16="http://schemas.microsoft.com/office/drawing/2014/main" id="{A6B0D6BD-8439-4382-B9EB-FE40F38F193A}"/>
+              </a:ext>
+            </a:extLst>
+          </p:cNvPr>
+          <p:cNvSpPr/>
+          <p:nvPr/>
+        </p:nvSpPr>
+        <p:spPr>
+          <a:xfrm>
+            <a:off x="2513366" y="953904"/>
+            <a:ext cx="1484049" cy="765699"/>
+          </a:xfrm>
+          <a:prstGeom prst="rect">
+            <a:avLst/>
+          </a:prstGeom>
+          <a:solidFill>
+            <a:schemeClr val="bg1"/>
+          </a:solidFill>
+          <a:ln w="28575">
+            <a:solidFill>
+              <a:schemeClr val="tx1"/>
+            </a:solidFill>
+            <a:prstDash val="sysDash"/>
+          </a:ln>
+        </p:spPr>
+        <p:style>
+          <a:lnRef idx="2">
+            <a:schemeClr val="accent1">
+              <a:shade val="50000"/>
+            </a:schemeClr>
+          </a:lnRef>
+          <a:fillRef idx="1">
+            <a:schemeClr val="accent1"/>
+          </a:fillRef>
+          <a:effectRef idx="0">
+            <a:schemeClr val="accent1"/>
+          </a:effectRef>
+          <a:fontRef idx="minor">
+            <a:schemeClr val="lt1"/>
+          </a:fontRef>
+        </p:style>
+        <p:txBody>
+          <a:bodyPr rtlCol="0" anchor="ctr"/>
+          <a:lstStyle/>
+          <a:p>
+            <a:pPr algn="ctr"/>
+            <a:r>
+              <a:rPr lang="en-US" altLang="zh-CN" b="1" dirty="0">
+                <a:solidFill>
+                  <a:schemeClr val="tx1"/>
+                </a:solidFill>
+              </a:rPr>
+              <a:t>Other</a:t>
+            </a:r>
+          </a:p>
+          <a:p>
+            <a:pPr algn="ctr"/>
+            <a:r>
+              <a:rPr lang="en-US" altLang="zh-CN" b="1" dirty="0">
+                <a:solidFill>
+                  <a:schemeClr val="tx1"/>
+                </a:solidFill>
+              </a:rPr>
+              <a:t>DataLoads</a:t>
+            </a:r>
+          </a:p>
+        </p:txBody>
+      </p:sp>
+      <p:sp>
+        <p:nvSpPr>
+          <p:cNvPr id="35" name="矩形 34">
+            <a:extLst>
+              <a:ext uri="{FF2B5EF4-FFF2-40B4-BE49-F238E27FC236}">
+                <a16:creationId xmlns:a16="http://schemas.microsoft.com/office/drawing/2014/main" id="{336D4E33-B73D-41E1-83CC-BDCF0012CC36}"/>
+              </a:ext>
+            </a:extLst>
+          </p:cNvPr>
+          <p:cNvSpPr/>
+          <p:nvPr/>
+        </p:nvSpPr>
+        <p:spPr>
+          <a:xfrm>
+            <a:off x="2604759" y="1048484"/>
+            <a:ext cx="1484049" cy="765699"/>
+          </a:xfrm>
+          <a:prstGeom prst="rect">
+            <a:avLst/>
+          </a:prstGeom>
+          <a:solidFill>
+            <a:schemeClr val="bg1"/>
+          </a:solidFill>
+          <a:ln w="28575">
+            <a:solidFill>
+              <a:schemeClr val="tx1"/>
+            </a:solidFill>
+            <a:prstDash val="sysDash"/>
+          </a:ln>
+        </p:spPr>
+        <p:style>
+          <a:lnRef idx="2">
+            <a:schemeClr val="accent1">
+              <a:shade val="50000"/>
+            </a:schemeClr>
+          </a:lnRef>
+          <a:fillRef idx="1">
+            <a:schemeClr val="accent1"/>
+          </a:fillRef>
+          <a:effectRef idx="0">
+            <a:schemeClr val="accent1"/>
+          </a:effectRef>
+          <a:fontRef idx="minor">
+            <a:schemeClr val="lt1"/>
+          </a:fontRef>
+        </p:style>
+        <p:txBody>
+          <a:bodyPr rtlCol="0" anchor="ctr"/>
+          <a:lstStyle/>
+          <a:p>
+            <a:pPr algn="ctr"/>
+            <a:r>
+              <a:rPr lang="en-US" altLang="zh-CN" b="1" dirty="0">
+                <a:solidFill>
+                  <a:schemeClr val="tx1"/>
+                </a:solidFill>
+              </a:rPr>
+              <a:t>Other</a:t>
+            </a:r>
+          </a:p>
+          <a:p>
+            <a:pPr algn="ctr"/>
+            <a:r>
+              <a:rPr lang="en-US" altLang="zh-CN" b="1" dirty="0">
+                <a:solidFill>
+                  <a:schemeClr val="tx1"/>
+                </a:solidFill>
+              </a:rPr>
+              <a:t>DataLoads</a:t>
             </a:r>
           </a:p>
         </p:txBody>

</xml_diff>